<commit_message>
Add hand component and smaller cards.
</commit_message>
<xml_diff>
--- a/wireframe.pptx
+++ b/wireframe.pptx
@@ -110,6 +110,11 @@
       </a:defRPr>
     </a:lvl9pPr>
   </p:defaultTextStyle>
+  <p:extLst>
+    <p:ext uri="{EFAFB233-063F-42B5-8137-9DF3F51BA10A}">
+      <p15:sldGuideLst xmlns:p15="http://schemas.microsoft.com/office/powerpoint/2012/main"/>
+    </p:ext>
+  </p:extLst>
 </p:presentation>
 </file>
 
@@ -260,7 +265,7 @@
           <a:p>
             <a:fld id="{5ED776B5-B62A-4A06-B5ED-AC0C40F46863}" type="datetimeFigureOut">
               <a:rPr lang="en-US" smtClean="0"/>
-              <a:t>2/14/2021</a:t>
+              <a:t>2/24/2021</a:t>
             </a:fld>
             <a:endParaRPr lang="en-US"/>
           </a:p>
@@ -458,7 +463,7 @@
           <a:p>
             <a:fld id="{5ED776B5-B62A-4A06-B5ED-AC0C40F46863}" type="datetimeFigureOut">
               <a:rPr lang="en-US" smtClean="0"/>
-              <a:t>2/14/2021</a:t>
+              <a:t>2/24/2021</a:t>
             </a:fld>
             <a:endParaRPr lang="en-US"/>
           </a:p>
@@ -666,7 +671,7 @@
           <a:p>
             <a:fld id="{5ED776B5-B62A-4A06-B5ED-AC0C40F46863}" type="datetimeFigureOut">
               <a:rPr lang="en-US" smtClean="0"/>
-              <a:t>2/14/2021</a:t>
+              <a:t>2/24/2021</a:t>
             </a:fld>
             <a:endParaRPr lang="en-US"/>
           </a:p>
@@ -864,7 +869,7 @@
           <a:p>
             <a:fld id="{5ED776B5-B62A-4A06-B5ED-AC0C40F46863}" type="datetimeFigureOut">
               <a:rPr lang="en-US" smtClean="0"/>
-              <a:t>2/14/2021</a:t>
+              <a:t>2/24/2021</a:t>
             </a:fld>
             <a:endParaRPr lang="en-US"/>
           </a:p>
@@ -1139,7 +1144,7 @@
           <a:p>
             <a:fld id="{5ED776B5-B62A-4A06-B5ED-AC0C40F46863}" type="datetimeFigureOut">
               <a:rPr lang="en-US" smtClean="0"/>
-              <a:t>2/14/2021</a:t>
+              <a:t>2/24/2021</a:t>
             </a:fld>
             <a:endParaRPr lang="en-US"/>
           </a:p>
@@ -1404,7 +1409,7 @@
           <a:p>
             <a:fld id="{5ED776B5-B62A-4A06-B5ED-AC0C40F46863}" type="datetimeFigureOut">
               <a:rPr lang="en-US" smtClean="0"/>
-              <a:t>2/14/2021</a:t>
+              <a:t>2/24/2021</a:t>
             </a:fld>
             <a:endParaRPr lang="en-US"/>
           </a:p>
@@ -1816,7 +1821,7 @@
           <a:p>
             <a:fld id="{5ED776B5-B62A-4A06-B5ED-AC0C40F46863}" type="datetimeFigureOut">
               <a:rPr lang="en-US" smtClean="0"/>
-              <a:t>2/14/2021</a:t>
+              <a:t>2/24/2021</a:t>
             </a:fld>
             <a:endParaRPr lang="en-US"/>
           </a:p>
@@ -1957,7 +1962,7 @@
           <a:p>
             <a:fld id="{5ED776B5-B62A-4A06-B5ED-AC0C40F46863}" type="datetimeFigureOut">
               <a:rPr lang="en-US" smtClean="0"/>
-              <a:t>2/14/2021</a:t>
+              <a:t>2/24/2021</a:t>
             </a:fld>
             <a:endParaRPr lang="en-US"/>
           </a:p>
@@ -2070,7 +2075,7 @@
           <a:p>
             <a:fld id="{5ED776B5-B62A-4A06-B5ED-AC0C40F46863}" type="datetimeFigureOut">
               <a:rPr lang="en-US" smtClean="0"/>
-              <a:t>2/14/2021</a:t>
+              <a:t>2/24/2021</a:t>
             </a:fld>
             <a:endParaRPr lang="en-US"/>
           </a:p>
@@ -2381,7 +2386,7 @@
           <a:p>
             <a:fld id="{5ED776B5-B62A-4A06-B5ED-AC0C40F46863}" type="datetimeFigureOut">
               <a:rPr lang="en-US" smtClean="0"/>
-              <a:t>2/14/2021</a:t>
+              <a:t>2/24/2021</a:t>
             </a:fld>
             <a:endParaRPr lang="en-US"/>
           </a:p>
@@ -2669,7 +2674,7 @@
           <a:p>
             <a:fld id="{5ED776B5-B62A-4A06-B5ED-AC0C40F46863}" type="datetimeFigureOut">
               <a:rPr lang="en-US" smtClean="0"/>
-              <a:t>2/14/2021</a:t>
+              <a:t>2/24/2021</a:t>
             </a:fld>
             <a:endParaRPr lang="en-US"/>
           </a:p>
@@ -2910,7 +2915,7 @@
           <a:p>
             <a:fld id="{5ED776B5-B62A-4A06-B5ED-AC0C40F46863}" type="datetimeFigureOut">
               <a:rPr lang="en-US" smtClean="0"/>
-              <a:t>2/14/2021</a:t>
+              <a:t>2/24/2021</a:t>
             </a:fld>
             <a:endParaRPr lang="en-US"/>
           </a:p>
@@ -5909,439 +5914,418 @@
           </p:txBody>
         </p:sp>
       </p:grpSp>
-      <p:grpSp>
-        <p:nvGrpSpPr>
-          <p:cNvPr id="141" name="Group 140">
-            <a:extLst>
-              <a:ext uri="{FF2B5EF4-FFF2-40B4-BE49-F238E27FC236}">
-                <a16:creationId xmlns:a16="http://schemas.microsoft.com/office/drawing/2014/main" id="{AF898613-C913-477F-88A9-5FC1AB743ECB}"/>
-              </a:ext>
-            </a:extLst>
-          </p:cNvPr>
-          <p:cNvGrpSpPr/>
+      <p:sp>
+        <p:nvSpPr>
+          <p:cNvPr id="142" name="Rectangle 141">
+            <a:extLst>
+              <a:ext uri="{FF2B5EF4-FFF2-40B4-BE49-F238E27FC236}">
+                <a16:creationId xmlns:a16="http://schemas.microsoft.com/office/drawing/2014/main" id="{DA36358E-5A07-4A76-97E3-CA43449AC3C6}"/>
+              </a:ext>
+            </a:extLst>
+          </p:cNvPr>
+          <p:cNvSpPr/>
           <p:nvPr/>
-        </p:nvGrpSpPr>
-        <p:grpSpPr>
+        </p:nvSpPr>
+        <p:spPr>
           <a:xfrm>
             <a:off x="345391" y="4082240"/>
             <a:ext cx="2241741" cy="1710866"/>
-            <a:chOff x="338729" y="486603"/>
-            <a:chExt cx="2241741" cy="1710866"/>
           </a:xfrm>
-        </p:grpSpPr>
-        <p:sp>
-          <p:nvSpPr>
-            <p:cNvPr id="142" name="Rectangle 141">
-              <a:extLst>
-                <a:ext uri="{FF2B5EF4-FFF2-40B4-BE49-F238E27FC236}">
-                  <a16:creationId xmlns:a16="http://schemas.microsoft.com/office/drawing/2014/main" id="{DA36358E-5A07-4A76-97E3-CA43449AC3C6}"/>
-                </a:ext>
-              </a:extLst>
-            </p:cNvPr>
-            <p:cNvSpPr/>
-            <p:nvPr/>
-          </p:nvSpPr>
-          <p:spPr>
-            <a:xfrm>
-              <a:off x="338729" y="486603"/>
-              <a:ext cx="2241741" cy="1710866"/>
-            </a:xfrm>
-            <a:prstGeom prst="rect">
-              <a:avLst/>
-            </a:prstGeom>
-            <a:noFill/>
-            <a:ln w="28575"/>
-          </p:spPr>
-          <p:style>
-            <a:lnRef idx="2">
-              <a:schemeClr val="dk1"/>
-            </a:lnRef>
-            <a:fillRef idx="1">
-              <a:schemeClr val="lt1"/>
-            </a:fillRef>
-            <a:effectRef idx="0">
-              <a:schemeClr val="dk1"/>
-            </a:effectRef>
-            <a:fontRef idx="minor">
-              <a:schemeClr val="dk1"/>
-            </a:fontRef>
-          </p:style>
-          <p:txBody>
-            <a:bodyPr rtlCol="0" anchor="ctr"/>
-            <a:lstStyle/>
-            <a:p>
-              <a:pPr algn="ctr"/>
-              <a:endParaRPr lang="en-US" dirty="0"/>
-            </a:p>
-          </p:txBody>
-        </p:sp>
-        <p:sp>
-          <p:nvSpPr>
-            <p:cNvPr id="143" name="Oval 142">
-              <a:extLst>
-                <a:ext uri="{FF2B5EF4-FFF2-40B4-BE49-F238E27FC236}">
-                  <a16:creationId xmlns:a16="http://schemas.microsoft.com/office/drawing/2014/main" id="{AA560216-8878-4CFC-A2DB-91D140899A37}"/>
-                </a:ext>
-              </a:extLst>
-            </p:cNvPr>
-            <p:cNvSpPr/>
-            <p:nvPr/>
-          </p:nvSpPr>
-          <p:spPr>
-            <a:xfrm>
-              <a:off x="479271" y="1107197"/>
-              <a:ext cx="539496" cy="530352"/>
-            </a:xfrm>
-            <a:prstGeom prst="ellipse">
-              <a:avLst/>
-            </a:prstGeom>
-            <a:gradFill flip="none" rotWithShape="1">
-              <a:gsLst>
-                <a:gs pos="0">
-                  <a:schemeClr val="accent6">
-                    <a:lumMod val="67000"/>
-                  </a:schemeClr>
-                </a:gs>
-                <a:gs pos="48000">
-                  <a:schemeClr val="accent6">
-                    <a:lumMod val="97000"/>
-                    <a:lumOff val="3000"/>
-                  </a:schemeClr>
-                </a:gs>
-                <a:gs pos="100000">
-                  <a:schemeClr val="accent6">
-                    <a:lumMod val="60000"/>
-                    <a:lumOff val="40000"/>
-                  </a:schemeClr>
-                </a:gs>
-              </a:gsLst>
-              <a:lin ang="16200000" scaled="1"/>
-              <a:tileRect/>
-            </a:gradFill>
-            <a:ln w="28575">
-              <a:solidFill>
-                <a:schemeClr val="tx1"/>
-              </a:solidFill>
-            </a:ln>
-          </p:spPr>
-          <p:style>
-            <a:lnRef idx="0">
-              <a:scrgbClr r="0" g="0" b="0"/>
-            </a:lnRef>
-            <a:fillRef idx="0">
-              <a:scrgbClr r="0" g="0" b="0"/>
-            </a:fillRef>
-            <a:effectRef idx="0">
-              <a:scrgbClr r="0" g="0" b="0"/>
-            </a:effectRef>
-            <a:fontRef idx="minor">
-              <a:schemeClr val="lt1"/>
-            </a:fontRef>
-          </p:style>
-          <p:txBody>
-            <a:bodyPr rtlCol="0" anchor="ctr"/>
-            <a:lstStyle/>
-            <a:p>
-              <a:pPr algn="ctr"/>
-              <a:r>
-                <a:rPr lang="en-US" dirty="0"/>
-                <a:t>T</a:t>
-              </a:r>
-            </a:p>
-          </p:txBody>
-        </p:sp>
-        <p:sp>
-          <p:nvSpPr>
-            <p:cNvPr id="144" name="TextBox 143">
-              <a:extLst>
-                <a:ext uri="{FF2B5EF4-FFF2-40B4-BE49-F238E27FC236}">
-                  <a16:creationId xmlns:a16="http://schemas.microsoft.com/office/drawing/2014/main" id="{04860C73-1453-4AE4-B2C0-3D02DDF2C488}"/>
-                </a:ext>
-              </a:extLst>
-            </p:cNvPr>
-            <p:cNvSpPr txBox="1"/>
-            <p:nvPr/>
-          </p:nvSpPr>
-          <p:spPr>
-            <a:xfrm>
-              <a:off x="423113" y="676753"/>
-              <a:ext cx="935384" cy="369332"/>
-            </a:xfrm>
-            <a:prstGeom prst="rect">
-              <a:avLst/>
-            </a:prstGeom>
-            <a:noFill/>
-          </p:spPr>
-          <p:txBody>
-            <a:bodyPr wrap="square" rtlCol="0">
-              <a:spAutoFit/>
-            </a:bodyPr>
-            <a:lstStyle/>
-            <a:p>
-              <a:r>
-                <a:rPr lang="en-US" dirty="0" err="1"/>
-                <a:t>WhyBot</a:t>
-              </a:r>
-              <a:endParaRPr lang="en-US" dirty="0"/>
-            </a:p>
-          </p:txBody>
-        </p:sp>
-        <p:pic>
-          <p:nvPicPr>
-            <p:cNvPr id="145" name="Graphic 144" descr="Trophy">
-              <a:extLst>
-                <a:ext uri="{FF2B5EF4-FFF2-40B4-BE49-F238E27FC236}">
-                  <a16:creationId xmlns:a16="http://schemas.microsoft.com/office/drawing/2014/main" id="{2AADA73B-09F8-4E19-A0D0-206885A184A3}"/>
-                </a:ext>
-              </a:extLst>
-            </p:cNvPr>
-            <p:cNvPicPr>
-              <a:picLocks noChangeAspect="1"/>
-            </p:cNvPicPr>
-            <p:nvPr/>
-          </p:nvPicPr>
-          <p:blipFill>
-            <a:blip r:embed="rId9">
-              <a:extLst>
-                <a:ext uri="{28A0092B-C50C-407E-A947-70E740481C1C}">
-                  <a14:useLocalDpi xmlns:a14="http://schemas.microsoft.com/office/drawing/2010/main" val="0"/>
-                </a:ext>
-                <a:ext uri="{96DAC541-7B7A-43D3-8B79-37D633B846F1}">
-                  <asvg:svgBlip xmlns:asvg="http://schemas.microsoft.com/office/drawing/2016/SVG/main" r:embed="rId10"/>
-                </a:ext>
-              </a:extLst>
-            </a:blip>
-            <a:stretch>
-              <a:fillRect/>
-            </a:stretch>
-          </p:blipFill>
-          <p:spPr>
-            <a:xfrm>
-              <a:off x="698727" y="1712851"/>
-              <a:ext cx="456248" cy="456248"/>
-            </a:xfrm>
-            <a:prstGeom prst="rect">
-              <a:avLst/>
-            </a:prstGeom>
-          </p:spPr>
-        </p:pic>
-        <p:sp>
-          <p:nvSpPr>
-            <p:cNvPr id="146" name="TextBox 145">
-              <a:extLst>
-                <a:ext uri="{FF2B5EF4-FFF2-40B4-BE49-F238E27FC236}">
-                  <a16:creationId xmlns:a16="http://schemas.microsoft.com/office/drawing/2014/main" id="{8E85628F-951C-4993-AD55-85A88EE4FC57}"/>
-                </a:ext>
-              </a:extLst>
-            </p:cNvPr>
-            <p:cNvSpPr txBox="1"/>
-            <p:nvPr/>
-          </p:nvSpPr>
-          <p:spPr>
-            <a:xfrm>
-              <a:off x="1060451" y="1774121"/>
-              <a:ext cx="418704" cy="369332"/>
-            </a:xfrm>
-            <a:prstGeom prst="rect">
-              <a:avLst/>
-            </a:prstGeom>
-            <a:noFill/>
-          </p:spPr>
-          <p:txBody>
-            <a:bodyPr wrap="square" rtlCol="0">
-              <a:spAutoFit/>
-            </a:bodyPr>
-            <a:lstStyle/>
-            <a:p>
-              <a:r>
-                <a:rPr lang="en-US" dirty="0"/>
-                <a:t>50</a:t>
-              </a:r>
-            </a:p>
-          </p:txBody>
-        </p:sp>
-        <p:pic>
-          <p:nvPicPr>
-            <p:cNvPr id="147" name="Picture 146">
-              <a:extLst>
-                <a:ext uri="{FF2B5EF4-FFF2-40B4-BE49-F238E27FC236}">
-                  <a16:creationId xmlns:a16="http://schemas.microsoft.com/office/drawing/2014/main" id="{E5D27C9A-345E-4BA4-BCE8-58F22B0FA740}"/>
-                </a:ext>
-              </a:extLst>
-            </p:cNvPr>
-            <p:cNvPicPr>
-              <a:picLocks noChangeAspect="1"/>
-            </p:cNvPicPr>
-            <p:nvPr/>
-          </p:nvPicPr>
-          <p:blipFill>
-            <a:blip r:embed="rId11">
-              <a:extLst>
-                <a:ext uri="{28A0092B-C50C-407E-A947-70E740481C1C}">
-                  <a14:useLocalDpi xmlns:a14="http://schemas.microsoft.com/office/drawing/2010/main" val="0"/>
-                </a:ext>
-              </a:extLst>
-            </a:blip>
-            <a:stretch>
-              <a:fillRect/>
-            </a:stretch>
-          </p:blipFill>
-          <p:spPr>
-            <a:xfrm>
-              <a:off x="1460568" y="622018"/>
-              <a:ext cx="830721" cy="485179"/>
-            </a:xfrm>
-            <a:prstGeom prst="rect">
-              <a:avLst/>
-            </a:prstGeom>
-          </p:spPr>
-        </p:pic>
-        <p:pic>
-          <p:nvPicPr>
-            <p:cNvPr id="148" name="Picture 147">
-              <a:extLst>
-                <a:ext uri="{FF2B5EF4-FFF2-40B4-BE49-F238E27FC236}">
-                  <a16:creationId xmlns:a16="http://schemas.microsoft.com/office/drawing/2014/main" id="{9962375D-D7B0-4945-8873-5023F2805255}"/>
-                </a:ext>
-              </a:extLst>
-            </p:cNvPr>
-            <p:cNvPicPr>
-              <a:picLocks noChangeAspect="1"/>
-            </p:cNvPicPr>
-            <p:nvPr/>
-          </p:nvPicPr>
-          <p:blipFill>
-            <a:blip r:embed="rId12">
-              <a:extLst>
-                <a:ext uri="{28A0092B-C50C-407E-A947-70E740481C1C}">
-                  <a14:useLocalDpi xmlns:a14="http://schemas.microsoft.com/office/drawing/2010/main" val="0"/>
-                </a:ext>
-              </a:extLst>
-            </a:blip>
-            <a:stretch>
-              <a:fillRect/>
-            </a:stretch>
-          </p:blipFill>
-          <p:spPr>
-            <a:xfrm>
-              <a:off x="1484281" y="1208177"/>
-              <a:ext cx="830719" cy="485178"/>
-            </a:xfrm>
-            <a:prstGeom prst="rect">
-              <a:avLst/>
-            </a:prstGeom>
-          </p:spPr>
-        </p:pic>
-        <p:sp>
-          <p:nvSpPr>
-            <p:cNvPr id="149" name="TextBox 148">
-              <a:extLst>
-                <a:ext uri="{FF2B5EF4-FFF2-40B4-BE49-F238E27FC236}">
-                  <a16:creationId xmlns:a16="http://schemas.microsoft.com/office/drawing/2014/main" id="{26D061F5-20E6-4E0B-94F5-44C2D7CAFD6A}"/>
-                </a:ext>
-              </a:extLst>
-            </p:cNvPr>
-            <p:cNvSpPr txBox="1"/>
-            <p:nvPr/>
-          </p:nvSpPr>
-          <p:spPr>
-            <a:xfrm>
-              <a:off x="2255877" y="761907"/>
-              <a:ext cx="301686" cy="369332"/>
-            </a:xfrm>
-            <a:prstGeom prst="rect">
-              <a:avLst/>
-            </a:prstGeom>
-            <a:noFill/>
-          </p:spPr>
-          <p:txBody>
-            <a:bodyPr wrap="square" rtlCol="0">
-              <a:spAutoFit/>
-            </a:bodyPr>
-            <a:lstStyle/>
-            <a:p>
-              <a:r>
-                <a:rPr lang="en-US" dirty="0"/>
-                <a:t>5</a:t>
-              </a:r>
-            </a:p>
-          </p:txBody>
-        </p:sp>
-        <p:pic>
-          <p:nvPicPr>
-            <p:cNvPr id="150" name="Graphic 149" descr="Chicken">
-              <a:extLst>
-                <a:ext uri="{FF2B5EF4-FFF2-40B4-BE49-F238E27FC236}">
-                  <a16:creationId xmlns:a16="http://schemas.microsoft.com/office/drawing/2014/main" id="{97FDBB2B-51DB-448B-A5A0-F2EF76376EEC}"/>
-                </a:ext>
-              </a:extLst>
-            </p:cNvPr>
-            <p:cNvPicPr>
-              <a:picLocks noChangeAspect="1"/>
-            </p:cNvPicPr>
-            <p:nvPr/>
-          </p:nvPicPr>
-          <p:blipFill>
-            <a:blip r:embed="rId13">
-              <a:extLst>
-                <a:ext uri="{28A0092B-C50C-407E-A947-70E740481C1C}">
-                  <a14:useLocalDpi xmlns:a14="http://schemas.microsoft.com/office/drawing/2010/main" val="0"/>
-                </a:ext>
-                <a:ext uri="{96DAC541-7B7A-43D3-8B79-37D633B846F1}">
-                  <asvg:svgBlip xmlns:asvg="http://schemas.microsoft.com/office/drawing/2016/SVG/main" r:embed="rId14"/>
-                </a:ext>
-              </a:extLst>
-            </a:blip>
-            <a:stretch>
-              <a:fillRect/>
-            </a:stretch>
-          </p:blipFill>
-          <p:spPr>
-            <a:xfrm>
-              <a:off x="1437429" y="1676275"/>
-              <a:ext cx="456249" cy="456249"/>
-            </a:xfrm>
-            <a:prstGeom prst="rect">
-              <a:avLst/>
-            </a:prstGeom>
-          </p:spPr>
-        </p:pic>
-        <p:sp>
-          <p:nvSpPr>
-            <p:cNvPr id="151" name="TextBox 150">
-              <a:extLst>
-                <a:ext uri="{FF2B5EF4-FFF2-40B4-BE49-F238E27FC236}">
-                  <a16:creationId xmlns:a16="http://schemas.microsoft.com/office/drawing/2014/main" id="{0EF3189E-8D82-41E9-A0D5-E41E5F85BAC5}"/>
-                </a:ext>
-              </a:extLst>
-            </p:cNvPr>
-            <p:cNvSpPr txBox="1"/>
-            <p:nvPr/>
-          </p:nvSpPr>
-          <p:spPr>
-            <a:xfrm>
-              <a:off x="1819926" y="1763192"/>
-              <a:ext cx="418704" cy="369332"/>
-            </a:xfrm>
-            <a:prstGeom prst="rect">
-              <a:avLst/>
-            </a:prstGeom>
-            <a:noFill/>
-          </p:spPr>
-          <p:txBody>
-            <a:bodyPr wrap="square" rtlCol="0">
-              <a:spAutoFit/>
-            </a:bodyPr>
-            <a:lstStyle/>
-            <a:p>
-              <a:r>
-                <a:rPr lang="en-US" dirty="0"/>
-                <a:t>42</a:t>
-              </a:r>
-            </a:p>
-          </p:txBody>
-        </p:sp>
-      </p:grpSp>
+          <a:prstGeom prst="rect">
+            <a:avLst/>
+          </a:prstGeom>
+          <a:noFill/>
+          <a:ln w="28575"/>
+        </p:spPr>
+        <p:style>
+          <a:lnRef idx="2">
+            <a:schemeClr val="dk1"/>
+          </a:lnRef>
+          <a:fillRef idx="1">
+            <a:schemeClr val="lt1"/>
+          </a:fillRef>
+          <a:effectRef idx="0">
+            <a:schemeClr val="dk1"/>
+          </a:effectRef>
+          <a:fontRef idx="minor">
+            <a:schemeClr val="dk1"/>
+          </a:fontRef>
+        </p:style>
+        <p:txBody>
+          <a:bodyPr rtlCol="0" anchor="ctr"/>
+          <a:lstStyle/>
+          <a:p>
+            <a:pPr algn="ctr"/>
+            <a:endParaRPr lang="en-US" dirty="0"/>
+          </a:p>
+        </p:txBody>
+      </p:sp>
+      <p:sp>
+        <p:nvSpPr>
+          <p:cNvPr id="143" name="Oval 142">
+            <a:extLst>
+              <a:ext uri="{FF2B5EF4-FFF2-40B4-BE49-F238E27FC236}">
+                <a16:creationId xmlns:a16="http://schemas.microsoft.com/office/drawing/2014/main" id="{AA560216-8878-4CFC-A2DB-91D140899A37}"/>
+              </a:ext>
+            </a:extLst>
+          </p:cNvPr>
+          <p:cNvSpPr/>
+          <p:nvPr/>
+        </p:nvSpPr>
+        <p:spPr>
+          <a:xfrm>
+            <a:off x="485933" y="4702834"/>
+            <a:ext cx="539496" cy="530352"/>
+          </a:xfrm>
+          <a:prstGeom prst="ellipse">
+            <a:avLst/>
+          </a:prstGeom>
+          <a:gradFill flip="none" rotWithShape="1">
+            <a:gsLst>
+              <a:gs pos="0">
+                <a:schemeClr val="accent6">
+                  <a:lumMod val="67000"/>
+                </a:schemeClr>
+              </a:gs>
+              <a:gs pos="48000">
+                <a:schemeClr val="accent6">
+                  <a:lumMod val="97000"/>
+                  <a:lumOff val="3000"/>
+                </a:schemeClr>
+              </a:gs>
+              <a:gs pos="100000">
+                <a:schemeClr val="accent6">
+                  <a:lumMod val="60000"/>
+                  <a:lumOff val="40000"/>
+                </a:schemeClr>
+              </a:gs>
+            </a:gsLst>
+            <a:lin ang="16200000" scaled="1"/>
+            <a:tileRect/>
+          </a:gradFill>
+          <a:ln w="28575">
+            <a:solidFill>
+              <a:schemeClr val="tx1"/>
+            </a:solidFill>
+          </a:ln>
+        </p:spPr>
+        <p:style>
+          <a:lnRef idx="0">
+            <a:scrgbClr r="0" g="0" b="0"/>
+          </a:lnRef>
+          <a:fillRef idx="0">
+            <a:scrgbClr r="0" g="0" b="0"/>
+          </a:fillRef>
+          <a:effectRef idx="0">
+            <a:scrgbClr r="0" g="0" b="0"/>
+          </a:effectRef>
+          <a:fontRef idx="minor">
+            <a:schemeClr val="lt1"/>
+          </a:fontRef>
+        </p:style>
+        <p:txBody>
+          <a:bodyPr rtlCol="0" anchor="ctr"/>
+          <a:lstStyle/>
+          <a:p>
+            <a:pPr algn="ctr"/>
+            <a:r>
+              <a:rPr lang="en-US" dirty="0"/>
+              <a:t>T</a:t>
+            </a:r>
+          </a:p>
+        </p:txBody>
+      </p:sp>
+      <p:sp>
+        <p:nvSpPr>
+          <p:cNvPr id="144" name="TextBox 143">
+            <a:extLst>
+              <a:ext uri="{FF2B5EF4-FFF2-40B4-BE49-F238E27FC236}">
+                <a16:creationId xmlns:a16="http://schemas.microsoft.com/office/drawing/2014/main" id="{04860C73-1453-4AE4-B2C0-3D02DDF2C488}"/>
+              </a:ext>
+            </a:extLst>
+          </p:cNvPr>
+          <p:cNvSpPr txBox="1"/>
+          <p:nvPr/>
+        </p:nvSpPr>
+        <p:spPr>
+          <a:xfrm>
+            <a:off x="429775" y="4272390"/>
+            <a:ext cx="935384" cy="369332"/>
+          </a:xfrm>
+          <a:prstGeom prst="rect">
+            <a:avLst/>
+          </a:prstGeom>
+          <a:noFill/>
+        </p:spPr>
+        <p:txBody>
+          <a:bodyPr wrap="square" rtlCol="0">
+            <a:spAutoFit/>
+          </a:bodyPr>
+          <a:lstStyle/>
+          <a:p>
+            <a:r>
+              <a:rPr lang="en-US" dirty="0" err="1"/>
+              <a:t>WhyBot</a:t>
+            </a:r>
+            <a:endParaRPr lang="en-US" dirty="0"/>
+          </a:p>
+        </p:txBody>
+      </p:sp>
+      <p:pic>
+        <p:nvPicPr>
+          <p:cNvPr id="145" name="Graphic 144" descr="Trophy">
+            <a:extLst>
+              <a:ext uri="{FF2B5EF4-FFF2-40B4-BE49-F238E27FC236}">
+                <a16:creationId xmlns:a16="http://schemas.microsoft.com/office/drawing/2014/main" id="{2AADA73B-09F8-4E19-A0D0-206885A184A3}"/>
+              </a:ext>
+            </a:extLst>
+          </p:cNvPr>
+          <p:cNvPicPr>
+            <a:picLocks noChangeAspect="1"/>
+          </p:cNvPicPr>
+          <p:nvPr/>
+        </p:nvPicPr>
+        <p:blipFill>
+          <a:blip r:embed="rId9">
+            <a:extLst>
+              <a:ext uri="{28A0092B-C50C-407E-A947-70E740481C1C}">
+                <a14:useLocalDpi xmlns:a14="http://schemas.microsoft.com/office/drawing/2010/main" val="0"/>
+              </a:ext>
+              <a:ext uri="{96DAC541-7B7A-43D3-8B79-37D633B846F1}">
+                <asvg:svgBlip xmlns:asvg="http://schemas.microsoft.com/office/drawing/2016/SVG/main" r:embed="rId10"/>
+              </a:ext>
+            </a:extLst>
+          </a:blip>
+          <a:stretch>
+            <a:fillRect/>
+          </a:stretch>
+        </p:blipFill>
+        <p:spPr>
+          <a:xfrm>
+            <a:off x="705389" y="5308488"/>
+            <a:ext cx="456248" cy="456248"/>
+          </a:xfrm>
+          <a:prstGeom prst="rect">
+            <a:avLst/>
+          </a:prstGeom>
+        </p:spPr>
+      </p:pic>
+      <p:sp>
+        <p:nvSpPr>
+          <p:cNvPr id="146" name="TextBox 145">
+            <a:extLst>
+              <a:ext uri="{FF2B5EF4-FFF2-40B4-BE49-F238E27FC236}">
+                <a16:creationId xmlns:a16="http://schemas.microsoft.com/office/drawing/2014/main" id="{8E85628F-951C-4993-AD55-85A88EE4FC57}"/>
+              </a:ext>
+            </a:extLst>
+          </p:cNvPr>
+          <p:cNvSpPr txBox="1"/>
+          <p:nvPr/>
+        </p:nvSpPr>
+        <p:spPr>
+          <a:xfrm>
+            <a:off x="1067113" y="5369758"/>
+            <a:ext cx="418704" cy="369332"/>
+          </a:xfrm>
+          <a:prstGeom prst="rect">
+            <a:avLst/>
+          </a:prstGeom>
+          <a:noFill/>
+        </p:spPr>
+        <p:txBody>
+          <a:bodyPr wrap="square" rtlCol="0">
+            <a:spAutoFit/>
+          </a:bodyPr>
+          <a:lstStyle/>
+          <a:p>
+            <a:r>
+              <a:rPr lang="en-US" dirty="0"/>
+              <a:t>50</a:t>
+            </a:r>
+          </a:p>
+        </p:txBody>
+      </p:sp>
+      <p:pic>
+        <p:nvPicPr>
+          <p:cNvPr id="147" name="Picture 146">
+            <a:extLst>
+              <a:ext uri="{FF2B5EF4-FFF2-40B4-BE49-F238E27FC236}">
+                <a16:creationId xmlns:a16="http://schemas.microsoft.com/office/drawing/2014/main" id="{E5D27C9A-345E-4BA4-BCE8-58F22B0FA740}"/>
+              </a:ext>
+            </a:extLst>
+          </p:cNvPr>
+          <p:cNvPicPr>
+            <a:picLocks noChangeAspect="1"/>
+          </p:cNvPicPr>
+          <p:nvPr/>
+        </p:nvPicPr>
+        <p:blipFill>
+          <a:blip r:embed="rId11">
+            <a:extLst>
+              <a:ext uri="{28A0092B-C50C-407E-A947-70E740481C1C}">
+                <a14:useLocalDpi xmlns:a14="http://schemas.microsoft.com/office/drawing/2010/main" val="0"/>
+              </a:ext>
+            </a:extLst>
+          </a:blip>
+          <a:stretch>
+            <a:fillRect/>
+          </a:stretch>
+        </p:blipFill>
+        <p:spPr>
+          <a:xfrm>
+            <a:off x="1467230" y="4217655"/>
+            <a:ext cx="830721" cy="485179"/>
+          </a:xfrm>
+          <a:prstGeom prst="rect">
+            <a:avLst/>
+          </a:prstGeom>
+        </p:spPr>
+      </p:pic>
+      <p:pic>
+        <p:nvPicPr>
+          <p:cNvPr id="148" name="Picture 147">
+            <a:extLst>
+              <a:ext uri="{FF2B5EF4-FFF2-40B4-BE49-F238E27FC236}">
+                <a16:creationId xmlns:a16="http://schemas.microsoft.com/office/drawing/2014/main" id="{9962375D-D7B0-4945-8873-5023F2805255}"/>
+              </a:ext>
+            </a:extLst>
+          </p:cNvPr>
+          <p:cNvPicPr>
+            <a:picLocks noChangeAspect="1"/>
+          </p:cNvPicPr>
+          <p:nvPr/>
+        </p:nvPicPr>
+        <p:blipFill>
+          <a:blip r:embed="rId12">
+            <a:extLst>
+              <a:ext uri="{28A0092B-C50C-407E-A947-70E740481C1C}">
+                <a14:useLocalDpi xmlns:a14="http://schemas.microsoft.com/office/drawing/2010/main" val="0"/>
+              </a:ext>
+            </a:extLst>
+          </a:blip>
+          <a:stretch>
+            <a:fillRect/>
+          </a:stretch>
+        </p:blipFill>
+        <p:spPr>
+          <a:xfrm>
+            <a:off x="1490943" y="4803814"/>
+            <a:ext cx="830719" cy="485178"/>
+          </a:xfrm>
+          <a:prstGeom prst="rect">
+            <a:avLst/>
+          </a:prstGeom>
+        </p:spPr>
+      </p:pic>
+      <p:sp>
+        <p:nvSpPr>
+          <p:cNvPr id="149" name="TextBox 148">
+            <a:extLst>
+              <a:ext uri="{FF2B5EF4-FFF2-40B4-BE49-F238E27FC236}">
+                <a16:creationId xmlns:a16="http://schemas.microsoft.com/office/drawing/2014/main" id="{26D061F5-20E6-4E0B-94F5-44C2D7CAFD6A}"/>
+              </a:ext>
+            </a:extLst>
+          </p:cNvPr>
+          <p:cNvSpPr txBox="1"/>
+          <p:nvPr/>
+        </p:nvSpPr>
+        <p:spPr>
+          <a:xfrm>
+            <a:off x="2262539" y="4357544"/>
+            <a:ext cx="301686" cy="369332"/>
+          </a:xfrm>
+          <a:prstGeom prst="rect">
+            <a:avLst/>
+          </a:prstGeom>
+          <a:noFill/>
+        </p:spPr>
+        <p:txBody>
+          <a:bodyPr wrap="square" rtlCol="0">
+            <a:spAutoFit/>
+          </a:bodyPr>
+          <a:lstStyle/>
+          <a:p>
+            <a:r>
+              <a:rPr lang="en-US" dirty="0"/>
+              <a:t>5</a:t>
+            </a:r>
+          </a:p>
+        </p:txBody>
+      </p:sp>
+      <p:pic>
+        <p:nvPicPr>
+          <p:cNvPr id="150" name="Graphic 149" descr="Chicken">
+            <a:extLst>
+              <a:ext uri="{FF2B5EF4-FFF2-40B4-BE49-F238E27FC236}">
+                <a16:creationId xmlns:a16="http://schemas.microsoft.com/office/drawing/2014/main" id="{97FDBB2B-51DB-448B-A5A0-F2EF76376EEC}"/>
+              </a:ext>
+            </a:extLst>
+          </p:cNvPr>
+          <p:cNvPicPr>
+            <a:picLocks noChangeAspect="1"/>
+          </p:cNvPicPr>
+          <p:nvPr/>
+        </p:nvPicPr>
+        <p:blipFill>
+          <a:blip r:embed="rId13">
+            <a:extLst>
+              <a:ext uri="{28A0092B-C50C-407E-A947-70E740481C1C}">
+                <a14:useLocalDpi xmlns:a14="http://schemas.microsoft.com/office/drawing/2010/main" val="0"/>
+              </a:ext>
+              <a:ext uri="{96DAC541-7B7A-43D3-8B79-37D633B846F1}">
+                <asvg:svgBlip xmlns:asvg="http://schemas.microsoft.com/office/drawing/2016/SVG/main" r:embed="rId14"/>
+              </a:ext>
+            </a:extLst>
+          </a:blip>
+          <a:stretch>
+            <a:fillRect/>
+          </a:stretch>
+        </p:blipFill>
+        <p:spPr>
+          <a:xfrm>
+            <a:off x="1444091" y="5271912"/>
+            <a:ext cx="456249" cy="456249"/>
+          </a:xfrm>
+          <a:prstGeom prst="rect">
+            <a:avLst/>
+          </a:prstGeom>
+        </p:spPr>
+      </p:pic>
+      <p:sp>
+        <p:nvSpPr>
+          <p:cNvPr id="151" name="TextBox 150">
+            <a:extLst>
+              <a:ext uri="{FF2B5EF4-FFF2-40B4-BE49-F238E27FC236}">
+                <a16:creationId xmlns:a16="http://schemas.microsoft.com/office/drawing/2014/main" id="{0EF3189E-8D82-41E9-A0D5-E41E5F85BAC5}"/>
+              </a:ext>
+            </a:extLst>
+          </p:cNvPr>
+          <p:cNvSpPr txBox="1"/>
+          <p:nvPr/>
+        </p:nvSpPr>
+        <p:spPr>
+          <a:xfrm>
+            <a:off x="1826588" y="5358829"/>
+            <a:ext cx="418704" cy="369332"/>
+          </a:xfrm>
+          <a:prstGeom prst="rect">
+            <a:avLst/>
+          </a:prstGeom>
+          <a:noFill/>
+        </p:spPr>
+        <p:txBody>
+          <a:bodyPr wrap="square" rtlCol="0">
+            <a:spAutoFit/>
+          </a:bodyPr>
+          <a:lstStyle/>
+          <a:p>
+            <a:r>
+              <a:rPr lang="en-US" dirty="0"/>
+              <a:t>42</a:t>
+            </a:r>
+          </a:p>
+        </p:txBody>
+      </p:sp>
       <p:sp>
         <p:nvSpPr>
           <p:cNvPr id="152" name="TextBox 151">
@@ -6671,6 +6655,150 @@
           </p:txBody>
         </p:sp>
       </p:grpSp>
+      <p:pic>
+        <p:nvPicPr>
+          <p:cNvPr id="3" name="Picture 2">
+            <a:extLst>
+              <a:ext uri="{FF2B5EF4-FFF2-40B4-BE49-F238E27FC236}">
+                <a16:creationId xmlns:a16="http://schemas.microsoft.com/office/drawing/2014/main" id="{D3F5F996-9153-418F-9EC5-AC027DACB109}"/>
+              </a:ext>
+            </a:extLst>
+          </p:cNvPr>
+          <p:cNvPicPr>
+            <a:picLocks noChangeAspect="1"/>
+          </p:cNvPicPr>
+          <p:nvPr/>
+        </p:nvPicPr>
+        <p:blipFill>
+          <a:blip r:embed="rId16">
+            <a:extLst>
+              <a:ext uri="{28A0092B-C50C-407E-A947-70E740481C1C}">
+                <a14:useLocalDpi xmlns:a14="http://schemas.microsoft.com/office/drawing/2010/main" val="0"/>
+              </a:ext>
+            </a:extLst>
+          </a:blip>
+          <a:stretch>
+            <a:fillRect/>
+          </a:stretch>
+        </p:blipFill>
+        <p:spPr>
+          <a:xfrm>
+            <a:off x="6584702" y="5295383"/>
+            <a:ext cx="863384" cy="504256"/>
+          </a:xfrm>
+          <a:prstGeom prst="rect">
+            <a:avLst/>
+          </a:prstGeom>
+        </p:spPr>
+      </p:pic>
+      <p:pic>
+        <p:nvPicPr>
+          <p:cNvPr id="5" name="Picture 4">
+            <a:extLst>
+              <a:ext uri="{FF2B5EF4-FFF2-40B4-BE49-F238E27FC236}">
+                <a16:creationId xmlns:a16="http://schemas.microsoft.com/office/drawing/2014/main" id="{3FC1AF01-31BF-4858-A036-86A362C5369B}"/>
+              </a:ext>
+            </a:extLst>
+          </p:cNvPr>
+          <p:cNvPicPr>
+            <a:picLocks noChangeAspect="1"/>
+          </p:cNvPicPr>
+          <p:nvPr/>
+        </p:nvPicPr>
+        <p:blipFill>
+          <a:blip r:embed="rId17">
+            <a:extLst>
+              <a:ext uri="{28A0092B-C50C-407E-A947-70E740481C1C}">
+                <a14:useLocalDpi xmlns:a14="http://schemas.microsoft.com/office/drawing/2010/main" val="0"/>
+              </a:ext>
+            </a:extLst>
+          </a:blip>
+          <a:stretch>
+            <a:fillRect/>
+          </a:stretch>
+        </p:blipFill>
+        <p:spPr>
+          <a:xfrm>
+            <a:off x="5486251" y="5279204"/>
+            <a:ext cx="857649" cy="498973"/>
+          </a:xfrm>
+          <a:prstGeom prst="rect">
+            <a:avLst/>
+          </a:prstGeom>
+        </p:spPr>
+      </p:pic>
+      <p:pic>
+        <p:nvPicPr>
+          <p:cNvPr id="7" name="Picture 6">
+            <a:extLst>
+              <a:ext uri="{FF2B5EF4-FFF2-40B4-BE49-F238E27FC236}">
+                <a16:creationId xmlns:a16="http://schemas.microsoft.com/office/drawing/2014/main" id="{9057722C-237B-4F1C-950E-1855E5D0378F}"/>
+              </a:ext>
+            </a:extLst>
+          </p:cNvPr>
+          <p:cNvPicPr>
+            <a:picLocks noChangeAspect="1"/>
+          </p:cNvPicPr>
+          <p:nvPr/>
+        </p:nvPicPr>
+        <p:blipFill>
+          <a:blip r:embed="rId18">
+            <a:extLst>
+              <a:ext uri="{28A0092B-C50C-407E-A947-70E740481C1C}">
+                <a14:useLocalDpi xmlns:a14="http://schemas.microsoft.com/office/drawing/2010/main" val="0"/>
+              </a:ext>
+            </a:extLst>
+          </a:blip>
+          <a:stretch>
+            <a:fillRect/>
+          </a:stretch>
+        </p:blipFill>
+        <p:spPr>
+          <a:xfrm>
+            <a:off x="6632237" y="6056767"/>
+            <a:ext cx="865251" cy="504627"/>
+          </a:xfrm>
+          <a:prstGeom prst="rect">
+            <a:avLst/>
+          </a:prstGeom>
+        </p:spPr>
+      </p:pic>
+      <p:pic>
+        <p:nvPicPr>
+          <p:cNvPr id="9" name="Picture 8">
+            <a:extLst>
+              <a:ext uri="{FF2B5EF4-FFF2-40B4-BE49-F238E27FC236}">
+                <a16:creationId xmlns:a16="http://schemas.microsoft.com/office/drawing/2014/main" id="{E7F257B0-F27C-4661-BE7C-C9534A50A8DA}"/>
+              </a:ext>
+            </a:extLst>
+          </p:cNvPr>
+          <p:cNvPicPr>
+            <a:picLocks noChangeAspect="1"/>
+          </p:cNvPicPr>
+          <p:nvPr/>
+        </p:nvPicPr>
+        <p:blipFill>
+          <a:blip r:embed="rId19">
+            <a:extLst>
+              <a:ext uri="{28A0092B-C50C-407E-A947-70E740481C1C}">
+                <a14:useLocalDpi xmlns:a14="http://schemas.microsoft.com/office/drawing/2010/main" val="0"/>
+              </a:ext>
+            </a:extLst>
+          </a:blip>
+          <a:stretch>
+            <a:fillRect/>
+          </a:stretch>
+        </p:blipFill>
+        <p:spPr>
+          <a:xfrm>
+            <a:off x="10702362" y="568074"/>
+            <a:ext cx="866485" cy="505347"/>
+          </a:xfrm>
+          <a:prstGeom prst="rect">
+            <a:avLst/>
+          </a:prstGeom>
+        </p:spPr>
+      </p:pic>
     </p:spTree>
     <p:extLst>
       <p:ext uri="{BB962C8B-B14F-4D97-AF65-F5344CB8AC3E}">

</xml_diff>